<commit_message>
renamed project to nervousnetHUB
</commit_message>
<xml_diff>
--- a/Documents/NervousNet_Redesign.pptx
+++ b/Documents/NervousNet_Redesign.pptx
@@ -32056,7 +32056,7 @@
         </p:nvSpPr>
         <p:spPr>
           <a:xfrm>
-            <a:off x="1650275" y="1689100"/>
+            <a:off x="1582539" y="1689100"/>
             <a:ext cx="387095" cy="215444"/>
           </a:xfrm>
           <a:prstGeom prst="rect">
@@ -32167,7 +32167,7 @@
         </p:nvSpPr>
         <p:spPr>
           <a:xfrm>
-            <a:off x="1719777" y="4302896"/>
+            <a:off x="1584305" y="4548439"/>
             <a:ext cx="530915" cy="338554"/>
           </a:xfrm>
           <a:prstGeom prst="rect">
@@ -32299,7 +32299,7 @@
         </p:nvSpPr>
         <p:spPr>
           <a:xfrm>
-            <a:off x="1613538" y="2652953"/>
+            <a:off x="1526968" y="2633132"/>
             <a:ext cx="571891" cy="338554"/>
           </a:xfrm>
           <a:prstGeom prst="rect">

</xml_diff>

<commit_message>
changes to powerpoint presentation
</commit_message>
<xml_diff>
--- a/Documents/NervousNet_Redesign.pptx
+++ b/Documents/NervousNet_Redesign.pptx
@@ -37438,7 +37438,11 @@
             </a:pPr>
             <a:r>
               <a:rPr lang="en-US" sz="1400" dirty="0" smtClean="0"/>
-              <a:t>View nervousnet Extensions Apps</a:t>
+              <a:t>View nervousnet Extensions </a:t>
+            </a:r>
+            <a:r>
+              <a:rPr lang="en-US" sz="1400" dirty="0" smtClean="0"/>
+              <a:t>Apps</a:t>
             </a:r>
           </a:p>
           <a:p>
@@ -37446,6 +37450,10 @@
               <a:buFont typeface="Arial"/>
               <a:buChar char="•"/>
             </a:pPr>
+            <a:r>
+              <a:rPr lang="en-US" sz="1400" dirty="0" smtClean="0"/>
+              <a:t>*******</a:t>
+            </a:r>
             <a:endParaRPr lang="en-US" sz="1400" dirty="0"/>
           </a:p>
         </p:txBody>
@@ -37618,10 +37626,10 @@
           <a:lstStyle/>
           <a:p>
             <a:r>
-              <a:rPr lang="en-US" smtClean="0"/>
+              <a:rPr lang="en-US" dirty="0" smtClean="0"/>
               <a:t>© ETH Zürich, COSS </a:t>
             </a:r>
-            <a:endParaRPr lang="en-US"/>
+            <a:endParaRPr lang="en-US" dirty="0"/>
           </a:p>
         </p:txBody>
       </p:sp>

</xml_diff>